<commit_message>
Add cosideration & revise ppt
</commit_message>
<xml_diff>
--- a/2팀_발표자료.pptx
+++ b/2팀_발표자료.pptx
@@ -29,12 +29,12 @@
   <p:notesSz cx="6858000" cy="9144000"/>
   <p:embeddedFontLst>
     <p:embeddedFont>
-      <p:font typeface="나눔바른고딕" panose="020B0603020101020101" pitchFamily="50" charset="-127"/>
+      <p:font typeface="맑은 고딕" panose="020B0503020000020004" pitchFamily="50" charset="-127"/>
       <p:regular r:id="rId19"/>
       <p:bold r:id="rId20"/>
     </p:embeddedFont>
     <p:embeddedFont>
-      <p:font typeface="맑은 고딕" panose="020B0503020000020004" pitchFamily="50" charset="-127"/>
+      <p:font typeface="나눔바른고딕" panose="020B0603020101020101" pitchFamily="50" charset="-127"/>
       <p:regular r:id="rId21"/>
       <p:bold r:id="rId22"/>
     </p:embeddedFont>
@@ -7520,41 +7520,7 @@
                   <a:latin typeface="나눔바른고딕" panose="020B0603020101020101" pitchFamily="50" charset="-127"/>
                   <a:ea typeface="나눔바른고딕" panose="020B0603020101020101" pitchFamily="50" charset="-127"/>
                 </a:rPr>
-                <a:t>을 적용하여 데이터 입력과 </a:t>
-              </a:r>
-              <a:r>
-                <a:rPr lang="ko-KR" altLang="en-US" smtClean="0">
-                  <a:ln>
-                    <a:solidFill>
-                      <a:srgbClr val="3E3E3E">
-                        <a:alpha val="15000"/>
-                      </a:srgbClr>
-                    </a:solidFill>
-                  </a:ln>
-                  <a:solidFill>
-                    <a:srgbClr val="3E3E3E"/>
-                  </a:solidFill>
-                  <a:latin typeface="나눔바른고딕" panose="020B0603020101020101" pitchFamily="50" charset="-127"/>
-                  <a:ea typeface="나눔바른고딕" panose="020B0603020101020101" pitchFamily="50" charset="-127"/>
-                </a:rPr>
-                <a:t>    이에 </a:t>
-              </a:r>
-              <a:r>
-                <a:rPr lang="ko-KR" altLang="en-US" smtClean="0">
-                  <a:ln>
-                    <a:solidFill>
-                      <a:srgbClr val="3E3E3E">
-                        <a:alpha val="15000"/>
-                      </a:srgbClr>
-                    </a:solidFill>
-                  </a:ln>
-                  <a:solidFill>
-                    <a:srgbClr val="3E3E3E"/>
-                  </a:solidFill>
-                  <a:latin typeface="나눔바른고딕" panose="020B0603020101020101" pitchFamily="50" charset="-127"/>
-                  <a:ea typeface="나눔바른고딕" panose="020B0603020101020101" pitchFamily="50" charset="-127"/>
-                </a:rPr>
-                <a:t>독립적인 호출 간의 지연시간을 최소화하였다</a:t>
+                <a:t>을 적용하여 데이터 입력과     이에 독립적인 호출 간의 지연시간을 최소화하였다</a:t>
               </a:r>
               <a:r>
                 <a:rPr lang="en-US" altLang="ko-KR" smtClean="0">
@@ -17671,7 +17637,7 @@
       </p:pic>
       <p:grpSp>
         <p:nvGrpSpPr>
-          <p:cNvPr id="56" name="그룹 55"/>
+          <p:cNvPr id="8" name="그룹 7"/>
           <p:cNvGrpSpPr/>
           <p:nvPr/>
         </p:nvGrpSpPr>
@@ -17679,97 +17645,523 @@
           <a:xfrm>
             <a:off x="2835547" y="1228399"/>
             <a:ext cx="6431446" cy="3767918"/>
-            <a:chOff x="3267635" y="1116106"/>
-            <a:chExt cx="6656294" cy="3899647"/>
+            <a:chOff x="2835547" y="1228399"/>
+            <a:chExt cx="6431446" cy="3767918"/>
           </a:xfrm>
         </p:grpSpPr>
-        <p:sp>
-          <p:nvSpPr>
-            <p:cNvPr id="57" name="직사각형 56"/>
-            <p:cNvSpPr/>
-            <p:nvPr/>
-          </p:nvSpPr>
-          <p:spPr>
-            <a:xfrm>
-              <a:off x="3267635" y="1116106"/>
-              <a:ext cx="6656294" cy="3899647"/>
-            </a:xfrm>
-            <a:prstGeom prst="rect">
-              <a:avLst/>
-            </a:prstGeom>
-            <a:solidFill>
-              <a:schemeClr val="bg1">
-                <a:lumMod val="85000"/>
-                <a:alpha val="90000"/>
-              </a:schemeClr>
-            </a:solidFill>
-            <a:ln>
-              <a:noFill/>
-            </a:ln>
-          </p:spPr>
-          <p:style>
-            <a:lnRef idx="2">
-              <a:schemeClr val="accent1">
-                <a:shade val="50000"/>
-              </a:schemeClr>
-            </a:lnRef>
-            <a:fillRef idx="1">
-              <a:schemeClr val="accent1"/>
-            </a:fillRef>
-            <a:effectRef idx="0">
-              <a:schemeClr val="accent1"/>
-            </a:effectRef>
-            <a:fontRef idx="minor">
-              <a:schemeClr val="lt1"/>
-            </a:fontRef>
-          </p:style>
-          <p:txBody>
-            <a:bodyPr rtlCol="0" anchor="ctr"/>
-            <a:lstStyle/>
-            <a:p>
-              <a:pPr algn="ctr"/>
-              <a:endParaRPr lang="ko-KR" altLang="en-US"/>
-            </a:p>
-          </p:txBody>
-        </p:sp>
         <p:grpSp>
           <p:nvGrpSpPr>
-            <p:cNvPr id="58" name="그룹 57"/>
+            <p:cNvPr id="56" name="그룹 55"/>
             <p:cNvGrpSpPr/>
             <p:nvPr/>
           </p:nvGrpSpPr>
           <p:grpSpPr>
             <a:xfrm>
-              <a:off x="3389769" y="1290918"/>
-              <a:ext cx="6445527" cy="3602162"/>
-              <a:chOff x="861722" y="914400"/>
-              <a:chExt cx="6445527" cy="3602162"/>
+              <a:off x="2835547" y="1228399"/>
+              <a:ext cx="6431446" cy="3767918"/>
+              <a:chOff x="3267635" y="1116106"/>
+              <a:chExt cx="6656294" cy="3899647"/>
             </a:xfrm>
           </p:grpSpPr>
+          <p:sp>
+            <p:nvSpPr>
+              <p:cNvPr id="57" name="직사각형 56"/>
+              <p:cNvSpPr/>
+              <p:nvPr/>
+            </p:nvSpPr>
+            <p:spPr>
+              <a:xfrm>
+                <a:off x="3267635" y="1116106"/>
+                <a:ext cx="6656294" cy="3899647"/>
+              </a:xfrm>
+              <a:prstGeom prst="rect">
+                <a:avLst/>
+              </a:prstGeom>
+              <a:solidFill>
+                <a:schemeClr val="bg1">
+                  <a:lumMod val="85000"/>
+                  <a:alpha val="90000"/>
+                </a:schemeClr>
+              </a:solidFill>
+              <a:ln>
+                <a:noFill/>
+              </a:ln>
+            </p:spPr>
+            <p:style>
+              <a:lnRef idx="2">
+                <a:schemeClr val="accent1">
+                  <a:shade val="50000"/>
+                </a:schemeClr>
+              </a:lnRef>
+              <a:fillRef idx="1">
+                <a:schemeClr val="accent1"/>
+              </a:fillRef>
+              <a:effectRef idx="0">
+                <a:schemeClr val="accent1"/>
+              </a:effectRef>
+              <a:fontRef idx="minor">
+                <a:schemeClr val="lt1"/>
+              </a:fontRef>
+            </p:style>
+            <p:txBody>
+              <a:bodyPr rtlCol="0" anchor="ctr"/>
+              <a:lstStyle/>
+              <a:p>
+                <a:pPr algn="ctr"/>
+                <a:endParaRPr lang="ko-KR" altLang="en-US"/>
+              </a:p>
+            </p:txBody>
+          </p:sp>
           <p:grpSp>
             <p:nvGrpSpPr>
-              <p:cNvPr id="59" name="그룹 58"/>
+              <p:cNvPr id="58" name="그룹 57"/>
               <p:cNvGrpSpPr/>
               <p:nvPr/>
             </p:nvGrpSpPr>
             <p:grpSpPr>
               <a:xfrm>
-                <a:off x="2027583" y="914400"/>
-                <a:ext cx="1359673" cy="1176793"/>
-                <a:chOff x="2027583" y="914400"/>
-                <a:chExt cx="1359673" cy="1176793"/>
+                <a:off x="3389769" y="1289855"/>
+                <a:ext cx="5822605" cy="3582131"/>
+                <a:chOff x="861722" y="913337"/>
+                <a:chExt cx="5822605" cy="3582131"/>
               </a:xfrm>
             </p:grpSpPr>
+            <p:grpSp>
+              <p:nvGrpSpPr>
+                <p:cNvPr id="59" name="그룹 58"/>
+                <p:cNvGrpSpPr/>
+                <p:nvPr/>
+              </p:nvGrpSpPr>
+              <p:grpSpPr>
+                <a:xfrm>
+                  <a:off x="2027583" y="914400"/>
+                  <a:ext cx="1359673" cy="1176793"/>
+                  <a:chOff x="2027583" y="914400"/>
+                  <a:chExt cx="1359673" cy="1176793"/>
+                </a:xfrm>
+              </p:grpSpPr>
+              <p:sp>
+                <p:nvSpPr>
+                  <p:cNvPr id="87" name="직사각형 86"/>
+                  <p:cNvSpPr/>
+                  <p:nvPr/>
+                </p:nvSpPr>
+                <p:spPr>
+                  <a:xfrm>
+                    <a:off x="2027583" y="914400"/>
+                    <a:ext cx="1359673" cy="1176793"/>
+                  </a:xfrm>
+                  <a:prstGeom prst="rect">
+                    <a:avLst/>
+                  </a:prstGeom>
+                  <a:noFill/>
+                  <a:ln>
+                    <a:solidFill>
+                      <a:schemeClr val="tx1">
+                        <a:lumMod val="65000"/>
+                        <a:lumOff val="35000"/>
+                      </a:schemeClr>
+                    </a:solidFill>
+                  </a:ln>
+                </p:spPr>
+                <p:style>
+                  <a:lnRef idx="2">
+                    <a:schemeClr val="accent1">
+                      <a:shade val="50000"/>
+                    </a:schemeClr>
+                  </a:lnRef>
+                  <a:fillRef idx="1">
+                    <a:schemeClr val="accent1"/>
+                  </a:fillRef>
+                  <a:effectRef idx="0">
+                    <a:schemeClr val="accent1"/>
+                  </a:effectRef>
+                  <a:fontRef idx="minor">
+                    <a:schemeClr val="lt1"/>
+                  </a:fontRef>
+                </p:style>
+                <p:txBody>
+                  <a:bodyPr rtlCol="0" anchor="ctr"/>
+                  <a:lstStyle/>
+                  <a:p>
+                    <a:pPr algn="ctr"/>
+                    <a:endParaRPr lang="ko-KR" altLang="en-US"/>
+                  </a:p>
+                </p:txBody>
+              </p:sp>
+              <p:sp>
+                <p:nvSpPr>
+                  <p:cNvPr id="88" name="직사각형 87"/>
+                  <p:cNvSpPr/>
+                  <p:nvPr/>
+                </p:nvSpPr>
+                <p:spPr>
+                  <a:xfrm>
+                    <a:off x="2027583" y="914400"/>
+                    <a:ext cx="270344" cy="254442"/>
+                  </a:xfrm>
+                  <a:prstGeom prst="rect">
+                    <a:avLst/>
+                  </a:prstGeom>
+                  <a:solidFill>
+                    <a:srgbClr val="FFFF00"/>
+                  </a:solidFill>
+                  <a:ln>
+                    <a:solidFill>
+                      <a:schemeClr val="tx1"/>
+                    </a:solidFill>
+                  </a:ln>
+                </p:spPr>
+                <p:style>
+                  <a:lnRef idx="2">
+                    <a:schemeClr val="accent1">
+                      <a:shade val="50000"/>
+                    </a:schemeClr>
+                  </a:lnRef>
+                  <a:fillRef idx="1">
+                    <a:schemeClr val="accent1"/>
+                  </a:fillRef>
+                  <a:effectRef idx="0">
+                    <a:schemeClr val="accent1"/>
+                  </a:effectRef>
+                  <a:fontRef idx="minor">
+                    <a:schemeClr val="lt1"/>
+                  </a:fontRef>
+                </p:style>
+                <p:txBody>
+                  <a:bodyPr rtlCol="0" anchor="ctr"/>
+                  <a:lstStyle/>
+                  <a:p>
+                    <a:pPr algn="ctr"/>
+                    <a:endParaRPr lang="ko-KR" altLang="en-US"/>
+                  </a:p>
+                </p:txBody>
+              </p:sp>
+              <p:sp>
+                <p:nvSpPr>
+                  <p:cNvPr id="89" name="TextBox 88"/>
+                  <p:cNvSpPr txBox="1"/>
+                  <p:nvPr/>
+                </p:nvSpPr>
+                <p:spPr>
+                  <a:xfrm>
+                    <a:off x="2488758" y="1749287"/>
+                    <a:ext cx="898498" cy="338554"/>
+                  </a:xfrm>
+                  <a:prstGeom prst="rect">
+                    <a:avLst/>
+                  </a:prstGeom>
+                  <a:noFill/>
+                </p:spPr>
+                <p:txBody>
+                  <a:bodyPr wrap="square" rtlCol="0">
+                    <a:spAutoFit/>
+                  </a:bodyPr>
+                  <a:lstStyle/>
+                  <a:p>
+                    <a:r>
+                      <a:rPr lang="en-US" altLang="ko-KR" sz="1600" dirty="0" smtClean="0"/>
+                      <a:t>Block 1</a:t>
+                    </a:r>
+                    <a:endParaRPr lang="ko-KR" altLang="en-US" sz="1600" dirty="0"/>
+                  </a:p>
+                </p:txBody>
+              </p:sp>
+            </p:grpSp>
+            <p:grpSp>
+              <p:nvGrpSpPr>
+                <p:cNvPr id="60" name="그룹 59"/>
+                <p:cNvGrpSpPr/>
+                <p:nvPr/>
+              </p:nvGrpSpPr>
+              <p:grpSpPr>
+                <a:xfrm>
+                  <a:off x="3665551" y="914400"/>
+                  <a:ext cx="1359673" cy="1176793"/>
+                  <a:chOff x="3665551" y="914400"/>
+                  <a:chExt cx="1359673" cy="1176793"/>
+                </a:xfrm>
+              </p:grpSpPr>
+              <p:sp>
+                <p:nvSpPr>
+                  <p:cNvPr id="84" name="직사각형 83"/>
+                  <p:cNvSpPr/>
+                  <p:nvPr/>
+                </p:nvSpPr>
+                <p:spPr>
+                  <a:xfrm>
+                    <a:off x="3665551" y="914400"/>
+                    <a:ext cx="1359673" cy="1176793"/>
+                  </a:xfrm>
+                  <a:prstGeom prst="rect">
+                    <a:avLst/>
+                  </a:prstGeom>
+                  <a:noFill/>
+                  <a:ln>
+                    <a:solidFill>
+                      <a:schemeClr val="tx1">
+                        <a:lumMod val="65000"/>
+                        <a:lumOff val="35000"/>
+                      </a:schemeClr>
+                    </a:solidFill>
+                  </a:ln>
+                </p:spPr>
+                <p:style>
+                  <a:lnRef idx="2">
+                    <a:schemeClr val="accent1">
+                      <a:shade val="50000"/>
+                    </a:schemeClr>
+                  </a:lnRef>
+                  <a:fillRef idx="1">
+                    <a:schemeClr val="accent1"/>
+                  </a:fillRef>
+                  <a:effectRef idx="0">
+                    <a:schemeClr val="accent1"/>
+                  </a:effectRef>
+                  <a:fontRef idx="minor">
+                    <a:schemeClr val="lt1"/>
+                  </a:fontRef>
+                </p:style>
+                <p:txBody>
+                  <a:bodyPr rtlCol="0" anchor="ctr"/>
+                  <a:lstStyle/>
+                  <a:p>
+                    <a:pPr algn="ctr"/>
+                    <a:endParaRPr lang="ko-KR" altLang="en-US"/>
+                  </a:p>
+                </p:txBody>
+              </p:sp>
+              <p:sp>
+                <p:nvSpPr>
+                  <p:cNvPr id="85" name="직사각형 84"/>
+                  <p:cNvSpPr/>
+                  <p:nvPr/>
+                </p:nvSpPr>
+                <p:spPr>
+                  <a:xfrm>
+                    <a:off x="3665551" y="914400"/>
+                    <a:ext cx="270344" cy="254442"/>
+                  </a:xfrm>
+                  <a:prstGeom prst="rect">
+                    <a:avLst/>
+                  </a:prstGeom>
+                  <a:solidFill>
+                    <a:srgbClr val="7030A0"/>
+                  </a:solidFill>
+                  <a:ln>
+                    <a:solidFill>
+                      <a:schemeClr val="tx1"/>
+                    </a:solidFill>
+                  </a:ln>
+                </p:spPr>
+                <p:style>
+                  <a:lnRef idx="2">
+                    <a:schemeClr val="accent1">
+                      <a:shade val="50000"/>
+                    </a:schemeClr>
+                  </a:lnRef>
+                  <a:fillRef idx="1">
+                    <a:schemeClr val="accent1"/>
+                  </a:fillRef>
+                  <a:effectRef idx="0">
+                    <a:schemeClr val="accent1"/>
+                  </a:effectRef>
+                  <a:fontRef idx="minor">
+                    <a:schemeClr val="lt1"/>
+                  </a:fontRef>
+                </p:style>
+                <p:txBody>
+                  <a:bodyPr rtlCol="0" anchor="ctr"/>
+                  <a:lstStyle/>
+                  <a:p>
+                    <a:pPr algn="ctr"/>
+                    <a:endParaRPr lang="ko-KR" altLang="en-US"/>
+                  </a:p>
+                </p:txBody>
+              </p:sp>
+              <p:sp>
+                <p:nvSpPr>
+                  <p:cNvPr id="86" name="TextBox 85"/>
+                  <p:cNvSpPr txBox="1"/>
+                  <p:nvPr/>
+                </p:nvSpPr>
+                <p:spPr>
+                  <a:xfrm>
+                    <a:off x="4126726" y="1749287"/>
+                    <a:ext cx="898498" cy="338554"/>
+                  </a:xfrm>
+                  <a:prstGeom prst="rect">
+                    <a:avLst/>
+                  </a:prstGeom>
+                  <a:noFill/>
+                </p:spPr>
+                <p:txBody>
+                  <a:bodyPr wrap="square" rtlCol="0">
+                    <a:spAutoFit/>
+                  </a:bodyPr>
+                  <a:lstStyle/>
+                  <a:p>
+                    <a:r>
+                      <a:rPr lang="en-US" altLang="ko-KR" sz="1600" dirty="0" smtClean="0"/>
+                      <a:t>Block 2</a:t>
+                    </a:r>
+                    <a:endParaRPr lang="ko-KR" altLang="en-US" sz="1600" dirty="0"/>
+                  </a:p>
+                </p:txBody>
+              </p:sp>
+            </p:grpSp>
+            <p:grpSp>
+              <p:nvGrpSpPr>
+                <p:cNvPr id="61" name="그룹 60"/>
+                <p:cNvGrpSpPr/>
+                <p:nvPr/>
+              </p:nvGrpSpPr>
+              <p:grpSpPr>
+                <a:xfrm>
+                  <a:off x="5303519" y="913337"/>
+                  <a:ext cx="1359673" cy="1177856"/>
+                  <a:chOff x="5303519" y="913337"/>
+                  <a:chExt cx="1359673" cy="1177856"/>
+                </a:xfrm>
+              </p:grpSpPr>
+              <p:sp>
+                <p:nvSpPr>
+                  <p:cNvPr id="81" name="직사각형 80"/>
+                  <p:cNvSpPr/>
+                  <p:nvPr/>
+                </p:nvSpPr>
+                <p:spPr>
+                  <a:xfrm>
+                    <a:off x="5303519" y="914400"/>
+                    <a:ext cx="1359673" cy="1176793"/>
+                  </a:xfrm>
+                  <a:prstGeom prst="rect">
+                    <a:avLst/>
+                  </a:prstGeom>
+                  <a:noFill/>
+                  <a:ln>
+                    <a:solidFill>
+                      <a:schemeClr val="tx1">
+                        <a:lumMod val="65000"/>
+                        <a:lumOff val="35000"/>
+                      </a:schemeClr>
+                    </a:solidFill>
+                  </a:ln>
+                </p:spPr>
+                <p:style>
+                  <a:lnRef idx="2">
+                    <a:schemeClr val="accent1">
+                      <a:shade val="50000"/>
+                    </a:schemeClr>
+                  </a:lnRef>
+                  <a:fillRef idx="1">
+                    <a:schemeClr val="accent1"/>
+                  </a:fillRef>
+                  <a:effectRef idx="0">
+                    <a:schemeClr val="accent1"/>
+                  </a:effectRef>
+                  <a:fontRef idx="minor">
+                    <a:schemeClr val="lt1"/>
+                  </a:fontRef>
+                </p:style>
+                <p:txBody>
+                  <a:bodyPr rtlCol="0" anchor="ctr"/>
+                  <a:lstStyle/>
+                  <a:p>
+                    <a:pPr algn="ctr"/>
+                    <a:endParaRPr lang="ko-KR" altLang="en-US"/>
+                  </a:p>
+                </p:txBody>
+              </p:sp>
+              <p:sp>
+                <p:nvSpPr>
+                  <p:cNvPr id="82" name="직사각형 81"/>
+                  <p:cNvSpPr/>
+                  <p:nvPr/>
+                </p:nvSpPr>
+                <p:spPr>
+                  <a:xfrm>
+                    <a:off x="5303519" y="913337"/>
+                    <a:ext cx="270344" cy="254442"/>
+                  </a:xfrm>
+                  <a:prstGeom prst="rect">
+                    <a:avLst/>
+                  </a:prstGeom>
+                  <a:solidFill>
+                    <a:srgbClr val="FFC000"/>
+                  </a:solidFill>
+                  <a:ln>
+                    <a:solidFill>
+                      <a:schemeClr val="tx1"/>
+                    </a:solidFill>
+                  </a:ln>
+                </p:spPr>
+                <p:style>
+                  <a:lnRef idx="2">
+                    <a:schemeClr val="accent1">
+                      <a:shade val="50000"/>
+                    </a:schemeClr>
+                  </a:lnRef>
+                  <a:fillRef idx="1">
+                    <a:schemeClr val="accent1"/>
+                  </a:fillRef>
+                  <a:effectRef idx="0">
+                    <a:schemeClr val="accent1"/>
+                  </a:effectRef>
+                  <a:fontRef idx="minor">
+                    <a:schemeClr val="lt1"/>
+                  </a:fontRef>
+                </p:style>
+                <p:txBody>
+                  <a:bodyPr rtlCol="0" anchor="ctr"/>
+                  <a:lstStyle/>
+                  <a:p>
+                    <a:pPr algn="ctr"/>
+                    <a:endParaRPr lang="ko-KR" altLang="en-US"/>
+                  </a:p>
+                </p:txBody>
+              </p:sp>
+              <p:sp>
+                <p:nvSpPr>
+                  <p:cNvPr id="83" name="TextBox 82"/>
+                  <p:cNvSpPr txBox="1"/>
+                  <p:nvPr/>
+                </p:nvSpPr>
+                <p:spPr>
+                  <a:xfrm>
+                    <a:off x="5764694" y="1749287"/>
+                    <a:ext cx="898498" cy="338554"/>
+                  </a:xfrm>
+                  <a:prstGeom prst="rect">
+                    <a:avLst/>
+                  </a:prstGeom>
+                  <a:noFill/>
+                </p:spPr>
+                <p:txBody>
+                  <a:bodyPr wrap="square" rtlCol="0">
+                    <a:spAutoFit/>
+                  </a:bodyPr>
+                  <a:lstStyle/>
+                  <a:p>
+                    <a:r>
+                      <a:rPr lang="en-US" altLang="ko-KR" sz="1600" dirty="0" smtClean="0"/>
+                      <a:t>Block 3</a:t>
+                    </a:r>
+                    <a:endParaRPr lang="ko-KR" altLang="en-US" sz="1600" dirty="0"/>
+                  </a:p>
+                </p:txBody>
+              </p:sp>
+            </p:grpSp>
             <p:sp>
               <p:nvSpPr>
-                <p:cNvPr id="87" name="직사각형 86"/>
+                <p:cNvPr id="62" name="직사각형 61"/>
                 <p:cNvSpPr/>
                 <p:nvPr/>
               </p:nvSpPr>
               <p:spPr>
                 <a:xfrm>
-                  <a:off x="2027583" y="914400"/>
-                  <a:ext cx="1359673" cy="1176793"/>
+                  <a:off x="1598215" y="3140765"/>
+                  <a:ext cx="5086112" cy="413468"/>
                 </a:xfrm>
                 <a:prstGeom prst="rect">
                   <a:avLst/>
@@ -17777,7 +18169,9 @@
                 <a:noFill/>
                 <a:ln>
                   <a:solidFill>
-                    <a:srgbClr val="0070C0"/>
+                    <a:schemeClr val="bg2">
+                      <a:lumMod val="10000"/>
+                    </a:schemeClr>
                   </a:solidFill>
                 </a:ln>
               </p:spPr>
@@ -17808,62 +18202,14 @@
             </p:sp>
             <p:sp>
               <p:nvSpPr>
-                <p:cNvPr id="88" name="직사각형 87"/>
-                <p:cNvSpPr/>
-                <p:nvPr/>
-              </p:nvSpPr>
-              <p:spPr>
-                <a:xfrm>
-                  <a:off x="2027583" y="914400"/>
-                  <a:ext cx="270344" cy="254442"/>
-                </a:xfrm>
-                <a:prstGeom prst="rect">
-                  <a:avLst/>
-                </a:prstGeom>
-                <a:solidFill>
-                  <a:srgbClr val="FFFF00"/>
-                </a:solidFill>
-                <a:ln>
-                  <a:solidFill>
-                    <a:schemeClr val="tx1"/>
-                  </a:solidFill>
-                </a:ln>
-              </p:spPr>
-              <p:style>
-                <a:lnRef idx="2">
-                  <a:schemeClr val="accent1">
-                    <a:shade val="50000"/>
-                  </a:schemeClr>
-                </a:lnRef>
-                <a:fillRef idx="1">
-                  <a:schemeClr val="accent1"/>
-                </a:fillRef>
-                <a:effectRef idx="0">
-                  <a:schemeClr val="accent1"/>
-                </a:effectRef>
-                <a:fontRef idx="minor">
-                  <a:schemeClr val="lt1"/>
-                </a:fontRef>
-              </p:style>
-              <p:txBody>
-                <a:bodyPr rtlCol="0" anchor="ctr"/>
-                <a:lstStyle/>
-                <a:p>
-                  <a:pPr algn="ctr"/>
-                  <a:endParaRPr lang="ko-KR" altLang="en-US"/>
-                </a:p>
-              </p:txBody>
-            </p:sp>
-            <p:sp>
-              <p:nvSpPr>
-                <p:cNvPr id="89" name="TextBox 88"/>
+                <p:cNvPr id="63" name="TextBox 62"/>
                 <p:cNvSpPr txBox="1"/>
                 <p:nvPr/>
               </p:nvSpPr>
               <p:spPr>
                 <a:xfrm>
-                  <a:off x="2488758" y="1749287"/>
-                  <a:ext cx="898498" cy="338554"/>
+                  <a:off x="1522675" y="2771433"/>
+                  <a:ext cx="1009816" cy="369332"/>
                 </a:xfrm>
                 <a:prstGeom prst="rect">
                   <a:avLst/>
@@ -17877,132 +18223,217 @@
                 <a:lstStyle/>
                 <a:p>
                   <a:r>
-                    <a:rPr lang="en-US" altLang="ko-KR" sz="1600" dirty="0" smtClean="0"/>
-                    <a:t>Block 1</a:t>
+                    <a:rPr lang="en-US" altLang="ko-KR" dirty="0" smtClean="0"/>
+                    <a:t>res</a:t>
                   </a:r>
-                  <a:endParaRPr lang="ko-KR" altLang="en-US" sz="1600" dirty="0"/>
+                  <a:endParaRPr lang="ko-KR" altLang="en-US" dirty="0"/>
                 </a:p>
               </p:txBody>
             </p:sp>
-          </p:grpSp>
-          <p:grpSp>
-            <p:nvGrpSpPr>
-              <p:cNvPr id="60" name="그룹 59"/>
-              <p:cNvGrpSpPr/>
-              <p:nvPr/>
-            </p:nvGrpSpPr>
-            <p:grpSpPr>
-              <a:xfrm>
-                <a:off x="3665551" y="914400"/>
-                <a:ext cx="1359673" cy="1176793"/>
-                <a:chOff x="3665551" y="914400"/>
-                <a:chExt cx="1359673" cy="1176793"/>
-              </a:xfrm>
-            </p:grpSpPr>
-            <p:sp>
-              <p:nvSpPr>
-                <p:cNvPr id="84" name="직사각형 83"/>
-                <p:cNvSpPr/>
+            <p:grpSp>
+              <p:nvGrpSpPr>
+                <p:cNvPr id="64" name="그룹 63"/>
+                <p:cNvGrpSpPr/>
                 <p:nvPr/>
-              </p:nvSpPr>
+              </p:nvGrpSpPr>
+              <p:grpSpPr>
+                <a:xfrm>
+                  <a:off x="1607225" y="3140765"/>
+                  <a:ext cx="1264258" cy="413468"/>
+                  <a:chOff x="1607225" y="3140765"/>
+                  <a:chExt cx="1264258" cy="413468"/>
+                </a:xfrm>
+              </p:grpSpPr>
+              <p:sp>
+                <p:nvSpPr>
+                  <p:cNvPr id="78" name="직사각형 77"/>
+                  <p:cNvSpPr/>
+                  <p:nvPr/>
+                </p:nvSpPr>
+                <p:spPr>
+                  <a:xfrm>
+                    <a:off x="1607225" y="3140765"/>
+                    <a:ext cx="421418" cy="413468"/>
+                  </a:xfrm>
+                  <a:prstGeom prst="rect">
+                    <a:avLst/>
+                  </a:prstGeom>
+                  <a:solidFill>
+                    <a:srgbClr val="FFFF00"/>
+                  </a:solidFill>
+                  <a:ln>
+                    <a:solidFill>
+                      <a:schemeClr val="tx1"/>
+                    </a:solidFill>
+                  </a:ln>
+                </p:spPr>
+                <p:style>
+                  <a:lnRef idx="2">
+                    <a:schemeClr val="accent1">
+                      <a:shade val="50000"/>
+                    </a:schemeClr>
+                  </a:lnRef>
+                  <a:fillRef idx="1">
+                    <a:schemeClr val="accent1"/>
+                  </a:fillRef>
+                  <a:effectRef idx="0">
+                    <a:schemeClr val="accent1"/>
+                  </a:effectRef>
+                  <a:fontRef idx="minor">
+                    <a:schemeClr val="lt1"/>
+                  </a:fontRef>
+                </p:style>
+                <p:txBody>
+                  <a:bodyPr rtlCol="0" anchor="ctr"/>
+                  <a:lstStyle/>
+                  <a:p>
+                    <a:pPr algn="ctr"/>
+                    <a:endParaRPr lang="ko-KR" altLang="en-US"/>
+                  </a:p>
+                </p:txBody>
+              </p:sp>
+              <p:sp>
+                <p:nvSpPr>
+                  <p:cNvPr id="79" name="직사각형 78"/>
+                  <p:cNvSpPr/>
+                  <p:nvPr/>
+                </p:nvSpPr>
+                <p:spPr>
+                  <a:xfrm>
+                    <a:off x="2028644" y="3140765"/>
+                    <a:ext cx="421418" cy="413468"/>
+                  </a:xfrm>
+                  <a:prstGeom prst="rect">
+                    <a:avLst/>
+                  </a:prstGeom>
+                  <a:solidFill>
+                    <a:srgbClr val="7030A0"/>
+                  </a:solidFill>
+                  <a:ln>
+                    <a:solidFill>
+                      <a:schemeClr val="tx1"/>
+                    </a:solidFill>
+                  </a:ln>
+                </p:spPr>
+                <p:style>
+                  <a:lnRef idx="2">
+                    <a:schemeClr val="accent1">
+                      <a:shade val="50000"/>
+                    </a:schemeClr>
+                  </a:lnRef>
+                  <a:fillRef idx="1">
+                    <a:schemeClr val="accent1"/>
+                  </a:fillRef>
+                  <a:effectRef idx="0">
+                    <a:schemeClr val="accent1"/>
+                  </a:effectRef>
+                  <a:fontRef idx="minor">
+                    <a:schemeClr val="lt1"/>
+                  </a:fontRef>
+                </p:style>
+                <p:txBody>
+                  <a:bodyPr rtlCol="0" anchor="ctr"/>
+                  <a:lstStyle/>
+                  <a:p>
+                    <a:pPr algn="ctr"/>
+                    <a:endParaRPr lang="ko-KR" altLang="en-US"/>
+                  </a:p>
+                </p:txBody>
+              </p:sp>
+              <p:sp>
+                <p:nvSpPr>
+                  <p:cNvPr id="80" name="직사각형 79"/>
+                  <p:cNvSpPr/>
+                  <p:nvPr/>
+                </p:nvSpPr>
+                <p:spPr>
+                  <a:xfrm>
+                    <a:off x="2450064" y="3140765"/>
+                    <a:ext cx="421419" cy="413468"/>
+                  </a:xfrm>
+                  <a:prstGeom prst="rect">
+                    <a:avLst/>
+                  </a:prstGeom>
+                  <a:solidFill>
+                    <a:srgbClr val="FFC000"/>
+                  </a:solidFill>
+                  <a:ln>
+                    <a:solidFill>
+                      <a:schemeClr val="tx1"/>
+                    </a:solidFill>
+                  </a:ln>
+                </p:spPr>
+                <p:style>
+                  <a:lnRef idx="2">
+                    <a:schemeClr val="accent1">
+                      <a:shade val="50000"/>
+                    </a:schemeClr>
+                  </a:lnRef>
+                  <a:fillRef idx="1">
+                    <a:schemeClr val="accent1"/>
+                  </a:fillRef>
+                  <a:effectRef idx="0">
+                    <a:schemeClr val="accent1"/>
+                  </a:effectRef>
+                  <a:fontRef idx="minor">
+                    <a:schemeClr val="lt1"/>
+                  </a:fontRef>
+                </p:style>
+                <p:txBody>
+                  <a:bodyPr rtlCol="0" anchor="ctr"/>
+                  <a:lstStyle/>
+                  <a:p>
+                    <a:pPr algn="ctr"/>
+                    <a:endParaRPr lang="ko-KR" altLang="en-US"/>
+                  </a:p>
+                </p:txBody>
+              </p:sp>
+            </p:grpSp>
+            <p:cxnSp>
+              <p:nvCxnSpPr>
+                <p:cNvPr id="66" name="직선 연결선 65"/>
+                <p:cNvCxnSpPr/>
+                <p:nvPr/>
+              </p:nvCxnSpPr>
               <p:spPr>
                 <a:xfrm>
-                  <a:off x="3665551" y="914400"/>
-                  <a:ext cx="1359673" cy="1176793"/>
+                  <a:off x="2862470" y="3140765"/>
+                  <a:ext cx="0" cy="1025718"/>
                 </a:xfrm>
-                <a:prstGeom prst="rect">
+                <a:prstGeom prst="line">
                   <a:avLst/>
                 </a:prstGeom>
-                <a:noFill/>
                 <a:ln>
                   <a:solidFill>
-                    <a:srgbClr val="FF0000"/>
+                    <a:schemeClr val="tx1"/>
                   </a:solidFill>
                 </a:ln>
               </p:spPr>
               <p:style>
-                <a:lnRef idx="2">
-                  <a:schemeClr val="accent1">
-                    <a:shade val="50000"/>
-                  </a:schemeClr>
+                <a:lnRef idx="1">
+                  <a:schemeClr val="accent1"/>
                 </a:lnRef>
-                <a:fillRef idx="1">
+                <a:fillRef idx="0">
                   <a:schemeClr val="accent1"/>
                 </a:fillRef>
                 <a:effectRef idx="0">
                   <a:schemeClr val="accent1"/>
                 </a:effectRef>
                 <a:fontRef idx="minor">
-                  <a:schemeClr val="lt1"/>
+                  <a:schemeClr val="tx1"/>
                 </a:fontRef>
               </p:style>
-              <p:txBody>
-                <a:bodyPr rtlCol="0" anchor="ctr"/>
-                <a:lstStyle/>
-                <a:p>
-                  <a:pPr algn="ctr"/>
-                  <a:endParaRPr lang="ko-KR" altLang="en-US"/>
-                </a:p>
-              </p:txBody>
-            </p:sp>
+            </p:cxnSp>
             <p:sp>
               <p:nvSpPr>
-                <p:cNvPr id="85" name="직사각형 84"/>
-                <p:cNvSpPr/>
-                <p:nvPr/>
-              </p:nvSpPr>
-              <p:spPr>
-                <a:xfrm>
-                  <a:off x="3665551" y="914400"/>
-                  <a:ext cx="270344" cy="254442"/>
-                </a:xfrm>
-                <a:prstGeom prst="rect">
-                  <a:avLst/>
-                </a:prstGeom>
-                <a:solidFill>
-                  <a:srgbClr val="7030A0"/>
-                </a:solidFill>
-                <a:ln>
-                  <a:solidFill>
-                    <a:schemeClr val="tx1"/>
-                  </a:solidFill>
-                </a:ln>
-              </p:spPr>
-              <p:style>
-                <a:lnRef idx="2">
-                  <a:schemeClr val="accent1">
-                    <a:shade val="50000"/>
-                  </a:schemeClr>
-                </a:lnRef>
-                <a:fillRef idx="1">
-                  <a:schemeClr val="accent1"/>
-                </a:fillRef>
-                <a:effectRef idx="0">
-                  <a:schemeClr val="accent1"/>
-                </a:effectRef>
-                <a:fontRef idx="minor">
-                  <a:schemeClr val="lt1"/>
-                </a:fontRef>
-              </p:style>
-              <p:txBody>
-                <a:bodyPr rtlCol="0" anchor="ctr"/>
-                <a:lstStyle/>
-                <a:p>
-                  <a:pPr algn="ctr"/>
-                  <a:endParaRPr lang="ko-KR" altLang="en-US"/>
-                </a:p>
-              </p:txBody>
-            </p:sp>
-            <p:sp>
-              <p:nvSpPr>
-                <p:cNvPr id="86" name="TextBox 85"/>
+                <p:cNvPr id="67" name="TextBox 66"/>
                 <p:cNvSpPr txBox="1"/>
                 <p:nvPr/>
               </p:nvSpPr>
               <p:spPr>
                 <a:xfrm>
-                  <a:off x="4126726" y="1749287"/>
-                  <a:ext cx="898498" cy="338554"/>
+                  <a:off x="2123992" y="4197261"/>
+                  <a:ext cx="1472980" cy="286683"/>
                 </a:xfrm>
                 <a:prstGeom prst="rect">
                   <a:avLst/>
@@ -18015,133 +18446,299 @@
                 </a:bodyPr>
                 <a:lstStyle/>
                 <a:p>
+                  <a:pPr algn="ctr"/>
                   <a:r>
-                    <a:rPr lang="en-US" altLang="ko-KR" sz="1600" dirty="0" smtClean="0"/>
-                    <a:t>Block 2</a:t>
+                    <a:rPr lang="en-US" altLang="ko-KR" sz="1200" dirty="0" err="1" smtClean="0"/>
+                    <a:t>threadIdx.x</a:t>
                   </a:r>
-                  <a:endParaRPr lang="ko-KR" altLang="en-US" sz="1600" dirty="0"/>
+                  <a:r>
+                    <a:rPr lang="en-US" altLang="ko-KR" sz="1200" dirty="0" smtClean="0"/>
+                    <a:t> = 1</a:t>
+                  </a:r>
+                  <a:endParaRPr lang="ko-KR" altLang="en-US" sz="1200" dirty="0"/>
                 </a:p>
               </p:txBody>
             </p:sp>
-          </p:grpSp>
-          <p:grpSp>
-            <p:nvGrpSpPr>
-              <p:cNvPr id="61" name="그룹 60"/>
-              <p:cNvGrpSpPr/>
-              <p:nvPr/>
-            </p:nvGrpSpPr>
-            <p:grpSpPr>
-              <a:xfrm>
-                <a:off x="5303519" y="914400"/>
-                <a:ext cx="1359673" cy="1176793"/>
-                <a:chOff x="5303519" y="914400"/>
-                <a:chExt cx="1359673" cy="1176793"/>
-              </a:xfrm>
-            </p:grpSpPr>
-            <p:sp>
-              <p:nvSpPr>
-                <p:cNvPr id="81" name="직사각형 80"/>
-                <p:cNvSpPr/>
+            <p:cxnSp>
+              <p:nvCxnSpPr>
+                <p:cNvPr id="68" name="직선 연결선 67"/>
+                <p:cNvCxnSpPr/>
                 <p:nvPr/>
-              </p:nvSpPr>
+              </p:nvCxnSpPr>
               <p:spPr>
                 <a:xfrm>
-                  <a:off x="5303519" y="914400"/>
-                  <a:ext cx="1359673" cy="1176793"/>
+                  <a:off x="4132691" y="3140765"/>
+                  <a:ext cx="0" cy="1025718"/>
                 </a:xfrm>
-                <a:prstGeom prst="rect">
+                <a:prstGeom prst="line">
                   <a:avLst/>
                 </a:prstGeom>
-                <a:noFill/>
                 <a:ln>
                   <a:solidFill>
-                    <a:srgbClr val="92D050"/>
+                    <a:schemeClr val="tx1"/>
                   </a:solidFill>
                 </a:ln>
               </p:spPr>
               <p:style>
-                <a:lnRef idx="2">
-                  <a:schemeClr val="accent1">
-                    <a:shade val="50000"/>
-                  </a:schemeClr>
+                <a:lnRef idx="1">
+                  <a:schemeClr val="accent1"/>
                 </a:lnRef>
-                <a:fillRef idx="1">
+                <a:fillRef idx="0">
                   <a:schemeClr val="accent1"/>
                 </a:fillRef>
                 <a:effectRef idx="0">
                   <a:schemeClr val="accent1"/>
                 </a:effectRef>
                 <a:fontRef idx="minor">
-                  <a:schemeClr val="lt1"/>
+                  <a:schemeClr val="tx1"/>
                 </a:fontRef>
               </p:style>
-              <p:txBody>
-                <a:bodyPr rtlCol="0" anchor="ctr"/>
-                <a:lstStyle/>
-                <a:p>
-                  <a:pPr algn="ctr"/>
-                  <a:endParaRPr lang="ko-KR" altLang="en-US"/>
-                </a:p>
-              </p:txBody>
-            </p:sp>
-            <p:sp>
-              <p:nvSpPr>
-                <p:cNvPr id="82" name="직사각형 81"/>
-                <p:cNvSpPr/>
+            </p:cxnSp>
+            <p:grpSp>
+              <p:nvGrpSpPr>
+                <p:cNvPr id="69" name="그룹 68"/>
+                <p:cNvGrpSpPr/>
                 <p:nvPr/>
-              </p:nvSpPr>
+              </p:nvGrpSpPr>
+              <p:grpSpPr>
+                <a:xfrm>
+                  <a:off x="2869495" y="3140765"/>
+                  <a:ext cx="1264258" cy="413468"/>
+                  <a:chOff x="1607225" y="3140765"/>
+                  <a:chExt cx="1264258" cy="413468"/>
+                </a:xfrm>
+              </p:grpSpPr>
+              <p:sp>
+                <p:nvSpPr>
+                  <p:cNvPr id="75" name="직사각형 74"/>
+                  <p:cNvSpPr/>
+                  <p:nvPr/>
+                </p:nvSpPr>
+                <p:spPr>
+                  <a:xfrm>
+                    <a:off x="1607225" y="3140765"/>
+                    <a:ext cx="421418" cy="413468"/>
+                  </a:xfrm>
+                  <a:prstGeom prst="rect">
+                    <a:avLst/>
+                  </a:prstGeom>
+                  <a:solidFill>
+                    <a:srgbClr val="FFFF00"/>
+                  </a:solidFill>
+                  <a:ln>
+                    <a:solidFill>
+                      <a:schemeClr val="tx1"/>
+                    </a:solidFill>
+                  </a:ln>
+                </p:spPr>
+                <p:style>
+                  <a:lnRef idx="2">
+                    <a:schemeClr val="accent1">
+                      <a:shade val="50000"/>
+                    </a:schemeClr>
+                  </a:lnRef>
+                  <a:fillRef idx="1">
+                    <a:schemeClr val="accent1"/>
+                  </a:fillRef>
+                  <a:effectRef idx="0">
+                    <a:schemeClr val="accent1"/>
+                  </a:effectRef>
+                  <a:fontRef idx="minor">
+                    <a:schemeClr val="lt1"/>
+                  </a:fontRef>
+                </p:style>
+                <p:txBody>
+                  <a:bodyPr rtlCol="0" anchor="ctr"/>
+                  <a:lstStyle/>
+                  <a:p>
+                    <a:pPr algn="ctr"/>
+                    <a:endParaRPr lang="ko-KR" altLang="en-US"/>
+                  </a:p>
+                </p:txBody>
+              </p:sp>
+              <p:sp>
+                <p:nvSpPr>
+                  <p:cNvPr id="76" name="직사각형 75"/>
+                  <p:cNvSpPr/>
+                  <p:nvPr/>
+                </p:nvSpPr>
+                <p:spPr>
+                  <a:xfrm>
+                    <a:off x="2028644" y="3140765"/>
+                    <a:ext cx="421418" cy="413468"/>
+                  </a:xfrm>
+                  <a:prstGeom prst="rect">
+                    <a:avLst/>
+                  </a:prstGeom>
+                  <a:solidFill>
+                    <a:srgbClr val="7030A0"/>
+                  </a:solidFill>
+                  <a:ln>
+                    <a:solidFill>
+                      <a:schemeClr val="tx1"/>
+                    </a:solidFill>
+                  </a:ln>
+                </p:spPr>
+                <p:style>
+                  <a:lnRef idx="2">
+                    <a:schemeClr val="accent1">
+                      <a:shade val="50000"/>
+                    </a:schemeClr>
+                  </a:lnRef>
+                  <a:fillRef idx="1">
+                    <a:schemeClr val="accent1"/>
+                  </a:fillRef>
+                  <a:effectRef idx="0">
+                    <a:schemeClr val="accent1"/>
+                  </a:effectRef>
+                  <a:fontRef idx="minor">
+                    <a:schemeClr val="lt1"/>
+                  </a:fontRef>
+                </p:style>
+                <p:txBody>
+                  <a:bodyPr rtlCol="0" anchor="ctr"/>
+                  <a:lstStyle/>
+                  <a:p>
+                    <a:pPr algn="ctr"/>
+                    <a:endParaRPr lang="ko-KR" altLang="en-US"/>
+                  </a:p>
+                </p:txBody>
+              </p:sp>
+              <p:sp>
+                <p:nvSpPr>
+                  <p:cNvPr id="77" name="직사각형 76"/>
+                  <p:cNvSpPr/>
+                  <p:nvPr/>
+                </p:nvSpPr>
+                <p:spPr>
+                  <a:xfrm>
+                    <a:off x="2450064" y="3140765"/>
+                    <a:ext cx="421419" cy="413468"/>
+                  </a:xfrm>
+                  <a:prstGeom prst="rect">
+                    <a:avLst/>
+                  </a:prstGeom>
+                  <a:solidFill>
+                    <a:srgbClr val="FFC000"/>
+                  </a:solidFill>
+                  <a:ln>
+                    <a:solidFill>
+                      <a:schemeClr val="tx1"/>
+                    </a:solidFill>
+                  </a:ln>
+                </p:spPr>
+                <p:style>
+                  <a:lnRef idx="2">
+                    <a:schemeClr val="accent1">
+                      <a:shade val="50000"/>
+                    </a:schemeClr>
+                  </a:lnRef>
+                  <a:fillRef idx="1">
+                    <a:schemeClr val="accent1"/>
+                  </a:fillRef>
+                  <a:effectRef idx="0">
+                    <a:schemeClr val="accent1"/>
+                  </a:effectRef>
+                  <a:fontRef idx="minor">
+                    <a:schemeClr val="lt1"/>
+                  </a:fontRef>
+                </p:style>
+                <p:txBody>
+                  <a:bodyPr rtlCol="0" anchor="ctr"/>
+                  <a:lstStyle/>
+                  <a:p>
+                    <a:pPr algn="ctr"/>
+                    <a:endParaRPr lang="ko-KR" altLang="en-US"/>
+                  </a:p>
+                </p:txBody>
+              </p:sp>
+            </p:grpSp>
+            <p:cxnSp>
+              <p:nvCxnSpPr>
+                <p:cNvPr id="70" name="직선 화살표 연결선 69"/>
+                <p:cNvCxnSpPr>
+                  <a:stCxn id="88" idx="2"/>
+                </p:cNvCxnSpPr>
+                <p:nvPr/>
+              </p:nvCxnSpPr>
               <p:spPr>
-                <a:xfrm>
-                  <a:off x="5303519" y="922351"/>
-                  <a:ext cx="270344" cy="254442"/>
+                <a:xfrm flipH="1">
+                  <a:off x="1757239" y="1168842"/>
+                  <a:ext cx="405516" cy="2178657"/>
                 </a:xfrm>
-                <a:prstGeom prst="rect">
+                <a:prstGeom prst="straightConnector1">
                   <a:avLst/>
                 </a:prstGeom>
-                <a:solidFill>
-                  <a:srgbClr val="FFC000"/>
-                </a:solidFill>
                 <a:ln>
                   <a:solidFill>
                     <a:schemeClr val="tx1"/>
                   </a:solidFill>
+                  <a:tailEnd type="triangle"/>
                 </a:ln>
               </p:spPr>
               <p:style>
-                <a:lnRef idx="2">
-                  <a:schemeClr val="accent1">
-                    <a:shade val="50000"/>
-                  </a:schemeClr>
+                <a:lnRef idx="1">
+                  <a:schemeClr val="accent1"/>
                 </a:lnRef>
-                <a:fillRef idx="1">
+                <a:fillRef idx="0">
                   <a:schemeClr val="accent1"/>
                 </a:fillRef>
                 <a:effectRef idx="0">
                   <a:schemeClr val="accent1"/>
                 </a:effectRef>
                 <a:fontRef idx="minor">
-                  <a:schemeClr val="lt1"/>
+                  <a:schemeClr val="tx1"/>
                 </a:fontRef>
               </p:style>
-              <p:txBody>
-                <a:bodyPr rtlCol="0" anchor="ctr"/>
-                <a:lstStyle/>
-                <a:p>
-                  <a:pPr algn="ctr"/>
-                  <a:endParaRPr lang="ko-KR" altLang="en-US"/>
-                </a:p>
-              </p:txBody>
-            </p:sp>
+            </p:cxnSp>
+            <p:cxnSp>
+              <p:nvCxnSpPr>
+                <p:cNvPr id="71" name="직선 화살표 연결선 70"/>
+                <p:cNvCxnSpPr>
+                  <a:stCxn id="85" idx="2"/>
+                </p:cNvCxnSpPr>
+                <p:nvPr/>
+              </p:nvCxnSpPr>
+              <p:spPr>
+                <a:xfrm flipH="1">
+                  <a:off x="2177664" y="1168842"/>
+                  <a:ext cx="1623059" cy="2164743"/>
+                </a:xfrm>
+                <a:prstGeom prst="straightConnector1">
+                  <a:avLst/>
+                </a:prstGeom>
+                <a:ln>
+                  <a:solidFill>
+                    <a:schemeClr val="tx1"/>
+                  </a:solidFill>
+                  <a:tailEnd type="triangle"/>
+                </a:ln>
+              </p:spPr>
+              <p:style>
+                <a:lnRef idx="1">
+                  <a:schemeClr val="accent1"/>
+                </a:lnRef>
+                <a:fillRef idx="0">
+                  <a:schemeClr val="accent1"/>
+                </a:fillRef>
+                <a:effectRef idx="0">
+                  <a:schemeClr val="accent1"/>
+                </a:effectRef>
+                <a:fontRef idx="minor">
+                  <a:schemeClr val="tx1"/>
+                </a:fontRef>
+              </p:style>
+            </p:cxnSp>
             <p:sp>
               <p:nvSpPr>
-                <p:cNvPr id="83" name="TextBox 82"/>
+                <p:cNvPr id="72" name="TextBox 71"/>
                 <p:cNvSpPr txBox="1"/>
                 <p:nvPr/>
               </p:nvSpPr>
               <p:spPr>
                 <a:xfrm>
-                  <a:off x="5764694" y="1749287"/>
-                  <a:ext cx="898498" cy="338554"/>
+                  <a:off x="3396201" y="4208785"/>
+                  <a:ext cx="1472980" cy="286683"/>
                 </a:xfrm>
                 <a:prstGeom prst="rect">
                   <a:avLst/>
@@ -18154,122 +18751,33 @@
                 </a:bodyPr>
                 <a:lstStyle/>
                 <a:p>
+                  <a:pPr algn="ctr"/>
                   <a:r>
-                    <a:rPr lang="en-US" altLang="ko-KR" sz="1600" dirty="0" smtClean="0"/>
-                    <a:t>Block 3</a:t>
+                    <a:rPr lang="en-US" altLang="ko-KR" sz="1200" dirty="0" err="1" smtClean="0"/>
+                    <a:t>threadIdx.x</a:t>
                   </a:r>
-                  <a:endParaRPr lang="ko-KR" altLang="en-US" sz="1600" dirty="0"/>
+                  <a:r>
+                    <a:rPr lang="en-US" altLang="ko-KR" sz="1200" dirty="0" smtClean="0"/>
+                    <a:t> = 2</a:t>
+                  </a:r>
+                  <a:endParaRPr lang="ko-KR" altLang="en-US" sz="1200" dirty="0"/>
                 </a:p>
               </p:txBody>
             </p:sp>
-          </p:grpSp>
-          <p:sp>
-            <p:nvSpPr>
-              <p:cNvPr id="62" name="직사각형 61"/>
-              <p:cNvSpPr/>
-              <p:nvPr/>
-            </p:nvSpPr>
-            <p:spPr>
-              <a:xfrm>
-                <a:off x="1598212" y="3140765"/>
-                <a:ext cx="5709037" cy="413468"/>
-              </a:xfrm>
-              <a:prstGeom prst="rect">
-                <a:avLst/>
-              </a:prstGeom>
-              <a:noFill/>
-              <a:ln>
-                <a:solidFill>
-                  <a:srgbClr val="C00000"/>
-                </a:solidFill>
-              </a:ln>
-            </p:spPr>
-            <p:style>
-              <a:lnRef idx="2">
-                <a:schemeClr val="accent1">
-                  <a:shade val="50000"/>
-                </a:schemeClr>
-              </a:lnRef>
-              <a:fillRef idx="1">
-                <a:schemeClr val="accent1"/>
-              </a:fillRef>
-              <a:effectRef idx="0">
-                <a:schemeClr val="accent1"/>
-              </a:effectRef>
-              <a:fontRef idx="minor">
-                <a:schemeClr val="lt1"/>
-              </a:fontRef>
-            </p:style>
-            <p:txBody>
-              <a:bodyPr rtlCol="0" anchor="ctr"/>
-              <a:lstStyle/>
-              <a:p>
-                <a:pPr algn="ctr"/>
-                <a:endParaRPr lang="ko-KR" altLang="en-US"/>
-              </a:p>
-            </p:txBody>
-          </p:sp>
-          <p:sp>
-            <p:nvSpPr>
-              <p:cNvPr id="63" name="TextBox 62"/>
-              <p:cNvSpPr txBox="1"/>
-              <p:nvPr/>
-            </p:nvSpPr>
-            <p:spPr>
-              <a:xfrm>
-                <a:off x="1522675" y="2771433"/>
-                <a:ext cx="1009816" cy="369332"/>
-              </a:xfrm>
-              <a:prstGeom prst="rect">
-                <a:avLst/>
-              </a:prstGeom>
-              <a:noFill/>
-            </p:spPr>
-            <p:txBody>
-              <a:bodyPr wrap="square" rtlCol="0">
-                <a:spAutoFit/>
-              </a:bodyPr>
-              <a:lstStyle/>
-              <a:p>
-                <a:r>
-                  <a:rPr lang="en-US" altLang="ko-KR" dirty="0" smtClean="0"/>
-                  <a:t>res</a:t>
-                </a:r>
-                <a:endParaRPr lang="ko-KR" altLang="en-US" dirty="0"/>
-              </a:p>
-            </p:txBody>
-          </p:sp>
-          <p:grpSp>
-            <p:nvGrpSpPr>
-              <p:cNvPr id="64" name="그룹 63"/>
-              <p:cNvGrpSpPr/>
-              <p:nvPr/>
-            </p:nvGrpSpPr>
-            <p:grpSpPr>
-              <a:xfrm>
-                <a:off x="1598212" y="3140765"/>
-                <a:ext cx="1264258" cy="413468"/>
-                <a:chOff x="1598212" y="3140765"/>
-                <a:chExt cx="1264258" cy="413468"/>
-              </a:xfrm>
-            </p:grpSpPr>
-            <p:sp>
-              <p:nvSpPr>
-                <p:cNvPr id="78" name="직사각형 77"/>
-                <p:cNvSpPr/>
+            <p:cxnSp>
+              <p:nvCxnSpPr>
+                <p:cNvPr id="73" name="직선 연결선 72"/>
+                <p:cNvCxnSpPr/>
                 <p:nvPr/>
-              </p:nvSpPr>
+              </p:nvCxnSpPr>
               <p:spPr>
                 <a:xfrm>
-                  <a:off x="1598212" y="3140765"/>
-                  <a:ext cx="421419" cy="413468"/>
+                  <a:off x="1598212" y="3171543"/>
+                  <a:ext cx="0" cy="1025718"/>
                 </a:xfrm>
-                <a:prstGeom prst="rect">
+                <a:prstGeom prst="line">
                   <a:avLst/>
                 </a:prstGeom>
-                <a:solidFill>
-                  <a:srgbClr val="FFFF00"/>
-                </a:solidFill>
                 <a:ln>
                   <a:solidFill>
                     <a:schemeClr val="tx1"/>
@@ -18277,611 +18785,460 @@
                 </a:ln>
               </p:spPr>
               <p:style>
-                <a:lnRef idx="2">
-                  <a:schemeClr val="accent1">
-                    <a:shade val="50000"/>
-                  </a:schemeClr>
+                <a:lnRef idx="1">
+                  <a:schemeClr val="accent1"/>
                 </a:lnRef>
-                <a:fillRef idx="1">
+                <a:fillRef idx="0">
                   <a:schemeClr val="accent1"/>
                 </a:fillRef>
                 <a:effectRef idx="0">
                   <a:schemeClr val="accent1"/>
                 </a:effectRef>
                 <a:fontRef idx="minor">
-                  <a:schemeClr val="lt1"/>
+                  <a:schemeClr val="tx1"/>
                 </a:fontRef>
               </p:style>
-              <p:txBody>
-                <a:bodyPr rtlCol="0" anchor="ctr"/>
-                <a:lstStyle/>
-                <a:p>
-                  <a:pPr algn="ctr"/>
-                  <a:endParaRPr lang="ko-KR" altLang="en-US"/>
-                </a:p>
-              </p:txBody>
-            </p:sp>
+            </p:cxnSp>
             <p:sp>
               <p:nvSpPr>
-                <p:cNvPr id="79" name="직사각형 78"/>
-                <p:cNvSpPr/>
+                <p:cNvPr id="74" name="TextBox 73"/>
+                <p:cNvSpPr txBox="1"/>
                 <p:nvPr/>
               </p:nvSpPr>
               <p:spPr>
                 <a:xfrm>
-                  <a:off x="2019631" y="3140765"/>
-                  <a:ext cx="421419" cy="413468"/>
+                  <a:off x="861722" y="4190337"/>
+                  <a:ext cx="1472980" cy="286683"/>
                 </a:xfrm>
                 <a:prstGeom prst="rect">
                   <a:avLst/>
                 </a:prstGeom>
-                <a:solidFill>
-                  <a:srgbClr val="7030A0"/>
-                </a:solidFill>
+                <a:noFill/>
+              </p:spPr>
+              <p:txBody>
+                <a:bodyPr wrap="square" rtlCol="0">
+                  <a:spAutoFit/>
+                </a:bodyPr>
+                <a:lstStyle/>
+                <a:p>
+                  <a:pPr algn="ctr"/>
+                  <a:r>
+                    <a:rPr lang="en-US" altLang="ko-KR" sz="1200" dirty="0" err="1" smtClean="0"/>
+                    <a:t>threadIdx.x</a:t>
+                  </a:r>
+                  <a:r>
+                    <a:rPr lang="en-US" altLang="ko-KR" sz="1200" dirty="0" smtClean="0"/>
+                    <a:t> = 0</a:t>
+                  </a:r>
+                  <a:endParaRPr lang="ko-KR" altLang="en-US" sz="1200" dirty="0"/>
+                </a:p>
+              </p:txBody>
+            </p:sp>
+            <p:cxnSp>
+              <p:nvCxnSpPr>
+                <p:cNvPr id="65" name="직선 화살표 연결선 64"/>
+                <p:cNvCxnSpPr>
+                  <a:stCxn id="82" idx="2"/>
+                </p:cNvCxnSpPr>
+                <p:nvPr/>
+              </p:nvCxnSpPr>
+              <p:spPr>
+                <a:xfrm flipH="1">
+                  <a:off x="2651760" y="1167780"/>
+                  <a:ext cx="2786931" cy="2170706"/>
+                </a:xfrm>
+                <a:prstGeom prst="straightConnector1">
+                  <a:avLst/>
+                </a:prstGeom>
                 <a:ln>
                   <a:solidFill>
                     <a:schemeClr val="tx1"/>
                   </a:solidFill>
+                  <a:tailEnd type="triangle"/>
                 </a:ln>
               </p:spPr>
               <p:style>
-                <a:lnRef idx="2">
-                  <a:schemeClr val="accent1">
-                    <a:shade val="50000"/>
-                  </a:schemeClr>
+                <a:lnRef idx="1">
+                  <a:schemeClr val="accent1"/>
                 </a:lnRef>
-                <a:fillRef idx="1">
+                <a:fillRef idx="0">
                   <a:schemeClr val="accent1"/>
                 </a:fillRef>
                 <a:effectRef idx="0">
                   <a:schemeClr val="accent1"/>
                 </a:effectRef>
                 <a:fontRef idx="minor">
-                  <a:schemeClr val="lt1"/>
+                  <a:schemeClr val="tx1"/>
                 </a:fontRef>
               </p:style>
-              <p:txBody>
-                <a:bodyPr rtlCol="0" anchor="ctr"/>
-                <a:lstStyle/>
-                <a:p>
-                  <a:pPr algn="ctr"/>
-                  <a:endParaRPr lang="ko-KR" altLang="en-US"/>
-                </a:p>
-              </p:txBody>
-            </p:sp>
-            <p:sp>
-              <p:nvSpPr>
-                <p:cNvPr id="80" name="직사각형 79"/>
-                <p:cNvSpPr/>
-                <p:nvPr/>
-              </p:nvSpPr>
-              <p:spPr>
-                <a:xfrm>
-                  <a:off x="2441051" y="3140765"/>
-                  <a:ext cx="421419" cy="413468"/>
-                </a:xfrm>
-                <a:prstGeom prst="rect">
-                  <a:avLst/>
-                </a:prstGeom>
-                <a:solidFill>
-                  <a:srgbClr val="FFC000"/>
-                </a:solidFill>
-                <a:ln>
-                  <a:solidFill>
-                    <a:schemeClr val="tx1"/>
-                  </a:solidFill>
-                </a:ln>
-              </p:spPr>
-              <p:style>
-                <a:lnRef idx="2">
-                  <a:schemeClr val="accent1">
-                    <a:shade val="50000"/>
-                  </a:schemeClr>
-                </a:lnRef>
-                <a:fillRef idx="1">
-                  <a:schemeClr val="accent1"/>
-                </a:fillRef>
-                <a:effectRef idx="0">
-                  <a:schemeClr val="accent1"/>
-                </a:effectRef>
-                <a:fontRef idx="minor">
-                  <a:schemeClr val="lt1"/>
-                </a:fontRef>
-              </p:style>
-              <p:txBody>
-                <a:bodyPr rtlCol="0" anchor="ctr"/>
-                <a:lstStyle/>
-                <a:p>
-                  <a:pPr algn="ctr"/>
-                  <a:endParaRPr lang="ko-KR" altLang="en-US"/>
-                </a:p>
-              </p:txBody>
-            </p:sp>
+            </p:cxnSp>
           </p:grpSp>
-          <p:cxnSp>
-            <p:nvCxnSpPr>
-              <p:cNvPr id="65" name="직선 화살표 연결선 64"/>
-              <p:cNvCxnSpPr>
-                <a:stCxn id="82" idx="2"/>
-              </p:cNvCxnSpPr>
-              <p:nvPr/>
-            </p:nvCxnSpPr>
-            <p:spPr>
-              <a:xfrm flipH="1">
-                <a:off x="2651760" y="1176793"/>
-                <a:ext cx="2786931" cy="2170706"/>
-              </a:xfrm>
-              <a:prstGeom prst="straightConnector1">
-                <a:avLst/>
-              </a:prstGeom>
-              <a:ln>
-                <a:solidFill>
-                  <a:schemeClr val="tx1"/>
-                </a:solidFill>
-                <a:tailEnd type="triangle"/>
-              </a:ln>
-            </p:spPr>
-            <p:style>
-              <a:lnRef idx="1">
-                <a:schemeClr val="accent1"/>
-              </a:lnRef>
-              <a:fillRef idx="0">
-                <a:schemeClr val="accent1"/>
-              </a:fillRef>
-              <a:effectRef idx="0">
-                <a:schemeClr val="accent1"/>
-              </a:effectRef>
-              <a:fontRef idx="minor">
+        </p:grpSp>
+        <p:sp>
+          <p:nvSpPr>
+            <p:cNvPr id="7" name="왼쪽 중괄호 6"/>
+            <p:cNvSpPr/>
+            <p:nvPr/>
+          </p:nvSpPr>
+          <p:spPr>
+            <a:xfrm rot="16200000">
+              <a:off x="5380984" y="3467982"/>
+              <a:ext cx="230677" cy="1201950"/>
+            </a:xfrm>
+            <a:prstGeom prst="leftBrace">
+              <a:avLst>
+                <a:gd name="adj1" fmla="val 8333"/>
+                <a:gd name="adj2" fmla="val 51154"/>
+              </a:avLst>
+            </a:prstGeom>
+            <a:ln>
+              <a:solidFill>
+                <a:srgbClr val="002060"/>
+              </a:solidFill>
+            </a:ln>
+          </p:spPr>
+          <p:style>
+            <a:lnRef idx="1">
+              <a:schemeClr val="accent1"/>
+            </a:lnRef>
+            <a:fillRef idx="0">
+              <a:schemeClr val="accent1"/>
+            </a:fillRef>
+            <a:effectRef idx="0">
+              <a:schemeClr val="accent1"/>
+            </a:effectRef>
+            <a:fontRef idx="minor">
+              <a:schemeClr val="tx1"/>
+            </a:fontRef>
+          </p:style>
+          <p:txBody>
+            <a:bodyPr rtlCol="0" anchor="ctr"/>
+            <a:lstStyle/>
+            <a:p>
+              <a:pPr algn="ctr"/>
+              <a:endParaRPr lang="ko-KR" altLang="en-US"/>
+            </a:p>
+          </p:txBody>
+        </p:sp>
+        <p:sp>
+          <p:nvSpPr>
+            <p:cNvPr id="46" name="TextBox 45"/>
+            <p:cNvSpPr txBox="1"/>
+            <p:nvPr/>
+          </p:nvSpPr>
+          <p:spPr>
+            <a:xfrm>
+              <a:off x="4783961" y="4208431"/>
+              <a:ext cx="1423223" cy="276999"/>
+            </a:xfrm>
+            <a:prstGeom prst="rect">
+              <a:avLst/>
+            </a:prstGeom>
+            <a:noFill/>
+          </p:spPr>
+          <p:txBody>
+            <a:bodyPr wrap="square" rtlCol="0">
+              <a:spAutoFit/>
+            </a:bodyPr>
+            <a:lstStyle/>
+            <a:p>
+              <a:pPr algn="ctr"/>
+              <a:r>
+                <a:rPr lang="en-US" altLang="ko-KR" sz="1200" dirty="0" err="1" smtClean="0"/>
+                <a:t>gridDim.x</a:t>
+              </a:r>
+              <a:endParaRPr lang="ko-KR" altLang="en-US" sz="1200" dirty="0"/>
+            </a:p>
+          </p:txBody>
+        </p:sp>
+        <p:sp>
+          <p:nvSpPr>
+            <p:cNvPr id="47" name="직사각형 46"/>
+            <p:cNvSpPr/>
+            <p:nvPr/>
+          </p:nvSpPr>
+          <p:spPr>
+            <a:xfrm>
+              <a:off x="6125509" y="3542416"/>
+              <a:ext cx="407184" cy="399501"/>
+            </a:xfrm>
+            <a:prstGeom prst="rect">
+              <a:avLst/>
+            </a:prstGeom>
+            <a:solidFill>
+              <a:srgbClr val="FFFF00"/>
+            </a:solidFill>
+            <a:ln>
+              <a:solidFill>
                 <a:schemeClr val="tx1"/>
-              </a:fontRef>
-            </p:style>
-          </p:cxnSp>
-          <p:cxnSp>
-            <p:nvCxnSpPr>
-              <p:cNvPr id="66" name="직선 연결선 65"/>
-              <p:cNvCxnSpPr/>
-              <p:nvPr/>
-            </p:nvCxnSpPr>
-            <p:spPr>
-              <a:xfrm>
-                <a:off x="2862470" y="3140765"/>
-                <a:ext cx="0" cy="1025718"/>
-              </a:xfrm>
-              <a:prstGeom prst="line">
-                <a:avLst/>
-              </a:prstGeom>
-              <a:ln>
-                <a:solidFill>
-                  <a:schemeClr val="tx1"/>
-                </a:solidFill>
-              </a:ln>
-            </p:spPr>
-            <p:style>
-              <a:lnRef idx="1">
-                <a:schemeClr val="accent1"/>
-              </a:lnRef>
-              <a:fillRef idx="0">
-                <a:schemeClr val="accent1"/>
-              </a:fillRef>
-              <a:effectRef idx="0">
-                <a:schemeClr val="accent1"/>
-              </a:effectRef>
-              <a:fontRef idx="minor">
+              </a:solidFill>
+            </a:ln>
+          </p:spPr>
+          <p:style>
+            <a:lnRef idx="2">
+              <a:schemeClr val="accent1">
+                <a:shade val="50000"/>
+              </a:schemeClr>
+            </a:lnRef>
+            <a:fillRef idx="1">
+              <a:schemeClr val="accent1"/>
+            </a:fillRef>
+            <a:effectRef idx="0">
+              <a:schemeClr val="accent1"/>
+            </a:effectRef>
+            <a:fontRef idx="minor">
+              <a:schemeClr val="lt1"/>
+            </a:fontRef>
+          </p:style>
+          <p:txBody>
+            <a:bodyPr rtlCol="0" anchor="ctr"/>
+            <a:lstStyle/>
+            <a:p>
+              <a:pPr algn="ctr"/>
+              <a:endParaRPr lang="ko-KR" altLang="en-US"/>
+            </a:p>
+          </p:txBody>
+        </p:sp>
+        <p:sp>
+          <p:nvSpPr>
+            <p:cNvPr id="48" name="직사각형 47"/>
+            <p:cNvSpPr/>
+            <p:nvPr/>
+          </p:nvSpPr>
+          <p:spPr>
+            <a:xfrm>
+              <a:off x="6532693" y="3542416"/>
+              <a:ext cx="407184" cy="399501"/>
+            </a:xfrm>
+            <a:prstGeom prst="rect">
+              <a:avLst/>
+            </a:prstGeom>
+            <a:solidFill>
+              <a:srgbClr val="7030A0"/>
+            </a:solidFill>
+            <a:ln>
+              <a:solidFill>
                 <a:schemeClr val="tx1"/>
-              </a:fontRef>
-            </p:style>
-          </p:cxnSp>
-          <p:sp>
-            <p:nvSpPr>
-              <p:cNvPr id="67" name="TextBox 66"/>
-              <p:cNvSpPr txBox="1"/>
-              <p:nvPr/>
-            </p:nvSpPr>
-            <p:spPr>
-              <a:xfrm>
-                <a:off x="2123992" y="4197261"/>
-                <a:ext cx="1472980" cy="307777"/>
-              </a:xfrm>
-              <a:prstGeom prst="rect">
-                <a:avLst/>
-              </a:prstGeom>
-              <a:noFill/>
-            </p:spPr>
-            <p:txBody>
-              <a:bodyPr wrap="square" rtlCol="0">
-                <a:spAutoFit/>
-              </a:bodyPr>
-              <a:lstStyle/>
-              <a:p>
-                <a:pPr algn="ctr"/>
-                <a:r>
-                  <a:rPr lang="en-US" altLang="ko-KR" sz="1400" dirty="0" err="1" smtClean="0"/>
-                  <a:t>gridDim.x</a:t>
-                </a:r>
-                <a:r>
-                  <a:rPr lang="en-US" altLang="ko-KR" sz="1400" dirty="0" smtClean="0"/>
-                  <a:t> = 1</a:t>
-                </a:r>
-                <a:endParaRPr lang="ko-KR" altLang="en-US" sz="1400" dirty="0"/>
-              </a:p>
-            </p:txBody>
-          </p:sp>
-          <p:cxnSp>
-            <p:nvCxnSpPr>
-              <p:cNvPr id="68" name="직선 연결선 67"/>
-              <p:cNvCxnSpPr/>
-              <p:nvPr/>
-            </p:nvCxnSpPr>
-            <p:spPr>
-              <a:xfrm>
-                <a:off x="4132691" y="3140765"/>
-                <a:ext cx="0" cy="1025718"/>
-              </a:xfrm>
-              <a:prstGeom prst="line">
-                <a:avLst/>
-              </a:prstGeom>
-              <a:ln>
-                <a:solidFill>
-                  <a:schemeClr val="tx1"/>
-                </a:solidFill>
-              </a:ln>
-            </p:spPr>
-            <p:style>
-              <a:lnRef idx="1">
-                <a:schemeClr val="accent1"/>
-              </a:lnRef>
-              <a:fillRef idx="0">
-                <a:schemeClr val="accent1"/>
-              </a:fillRef>
-              <a:effectRef idx="0">
-                <a:schemeClr val="accent1"/>
-              </a:effectRef>
-              <a:fontRef idx="minor">
+              </a:solidFill>
+            </a:ln>
+          </p:spPr>
+          <p:style>
+            <a:lnRef idx="2">
+              <a:schemeClr val="accent1">
+                <a:shade val="50000"/>
+              </a:schemeClr>
+            </a:lnRef>
+            <a:fillRef idx="1">
+              <a:schemeClr val="accent1"/>
+            </a:fillRef>
+            <a:effectRef idx="0">
+              <a:schemeClr val="accent1"/>
+            </a:effectRef>
+            <a:fontRef idx="minor">
+              <a:schemeClr val="lt1"/>
+            </a:fontRef>
+          </p:style>
+          <p:txBody>
+            <a:bodyPr rtlCol="0" anchor="ctr"/>
+            <a:lstStyle/>
+            <a:p>
+              <a:pPr algn="ctr"/>
+              <a:endParaRPr lang="ko-KR" altLang="en-US"/>
+            </a:p>
+          </p:txBody>
+        </p:sp>
+        <p:sp>
+          <p:nvSpPr>
+            <p:cNvPr id="49" name="직사각형 48"/>
+            <p:cNvSpPr/>
+            <p:nvPr/>
+          </p:nvSpPr>
+          <p:spPr>
+            <a:xfrm>
+              <a:off x="6939877" y="3542416"/>
+              <a:ext cx="407184" cy="399501"/>
+            </a:xfrm>
+            <a:prstGeom prst="rect">
+              <a:avLst/>
+            </a:prstGeom>
+            <a:solidFill>
+              <a:srgbClr val="FFC000"/>
+            </a:solidFill>
+            <a:ln>
+              <a:solidFill>
                 <a:schemeClr val="tx1"/>
-              </a:fontRef>
-            </p:style>
-          </p:cxnSp>
-          <p:grpSp>
-            <p:nvGrpSpPr>
-              <p:cNvPr id="69" name="그룹 68"/>
-              <p:cNvGrpSpPr/>
-              <p:nvPr/>
-            </p:nvGrpSpPr>
-            <p:grpSpPr>
-              <a:xfrm>
-                <a:off x="2860482" y="3140765"/>
-                <a:ext cx="1264258" cy="413468"/>
-                <a:chOff x="1598212" y="3140765"/>
-                <a:chExt cx="1264258" cy="413468"/>
-              </a:xfrm>
-            </p:grpSpPr>
-            <p:sp>
-              <p:nvSpPr>
-                <p:cNvPr id="75" name="직사각형 74"/>
-                <p:cNvSpPr/>
-                <p:nvPr/>
-              </p:nvSpPr>
-              <p:spPr>
-                <a:xfrm>
-                  <a:off x="1598212" y="3140765"/>
-                  <a:ext cx="421419" cy="413468"/>
-                </a:xfrm>
-                <a:prstGeom prst="rect">
-                  <a:avLst/>
-                </a:prstGeom>
-                <a:solidFill>
-                  <a:srgbClr val="FFFF00"/>
-                </a:solidFill>
-                <a:ln>
-                  <a:solidFill>
-                    <a:schemeClr val="tx1"/>
-                  </a:solidFill>
-                </a:ln>
-              </p:spPr>
-              <p:style>
-                <a:lnRef idx="2">
-                  <a:schemeClr val="accent1">
-                    <a:shade val="50000"/>
-                  </a:schemeClr>
-                </a:lnRef>
-                <a:fillRef idx="1">
-                  <a:schemeClr val="accent1"/>
-                </a:fillRef>
-                <a:effectRef idx="0">
-                  <a:schemeClr val="accent1"/>
-                </a:effectRef>
-                <a:fontRef idx="minor">
-                  <a:schemeClr val="lt1"/>
-                </a:fontRef>
-              </p:style>
-              <p:txBody>
-                <a:bodyPr rtlCol="0" anchor="ctr"/>
-                <a:lstStyle/>
-                <a:p>
-                  <a:pPr algn="ctr"/>
-                  <a:endParaRPr lang="ko-KR" altLang="en-US"/>
-                </a:p>
-              </p:txBody>
-            </p:sp>
-            <p:sp>
-              <p:nvSpPr>
-                <p:cNvPr id="76" name="직사각형 75"/>
-                <p:cNvSpPr/>
-                <p:nvPr/>
-              </p:nvSpPr>
-              <p:spPr>
-                <a:xfrm>
-                  <a:off x="2019631" y="3140765"/>
-                  <a:ext cx="421419" cy="413468"/>
-                </a:xfrm>
-                <a:prstGeom prst="rect">
-                  <a:avLst/>
-                </a:prstGeom>
-                <a:solidFill>
-                  <a:srgbClr val="7030A0"/>
-                </a:solidFill>
-                <a:ln>
-                  <a:solidFill>
-                    <a:schemeClr val="tx1"/>
-                  </a:solidFill>
-                </a:ln>
-              </p:spPr>
-              <p:style>
-                <a:lnRef idx="2">
-                  <a:schemeClr val="accent1">
-                    <a:shade val="50000"/>
-                  </a:schemeClr>
-                </a:lnRef>
-                <a:fillRef idx="1">
-                  <a:schemeClr val="accent1"/>
-                </a:fillRef>
-                <a:effectRef idx="0">
-                  <a:schemeClr val="accent1"/>
-                </a:effectRef>
-                <a:fontRef idx="minor">
-                  <a:schemeClr val="lt1"/>
-                </a:fontRef>
-              </p:style>
-              <p:txBody>
-                <a:bodyPr rtlCol="0" anchor="ctr"/>
-                <a:lstStyle/>
-                <a:p>
-                  <a:pPr algn="ctr"/>
-                  <a:endParaRPr lang="ko-KR" altLang="en-US"/>
-                </a:p>
-              </p:txBody>
-            </p:sp>
-            <p:sp>
-              <p:nvSpPr>
-                <p:cNvPr id="77" name="직사각형 76"/>
-                <p:cNvSpPr/>
-                <p:nvPr/>
-              </p:nvSpPr>
-              <p:spPr>
-                <a:xfrm>
-                  <a:off x="2441051" y="3140765"/>
-                  <a:ext cx="421419" cy="413468"/>
-                </a:xfrm>
-                <a:prstGeom prst="rect">
-                  <a:avLst/>
-                </a:prstGeom>
-                <a:solidFill>
-                  <a:srgbClr val="FFC000"/>
-                </a:solidFill>
-                <a:ln>
-                  <a:solidFill>
-                    <a:schemeClr val="tx1"/>
-                  </a:solidFill>
-                </a:ln>
-              </p:spPr>
-              <p:style>
-                <a:lnRef idx="2">
-                  <a:schemeClr val="accent1">
-                    <a:shade val="50000"/>
-                  </a:schemeClr>
-                </a:lnRef>
-                <a:fillRef idx="1">
-                  <a:schemeClr val="accent1"/>
-                </a:fillRef>
-                <a:effectRef idx="0">
-                  <a:schemeClr val="accent1"/>
-                </a:effectRef>
-                <a:fontRef idx="minor">
-                  <a:schemeClr val="lt1"/>
-                </a:fontRef>
-              </p:style>
-              <p:txBody>
-                <a:bodyPr rtlCol="0" anchor="ctr"/>
-                <a:lstStyle/>
-                <a:p>
-                  <a:pPr algn="ctr"/>
-                  <a:endParaRPr lang="ko-KR" altLang="en-US"/>
-                </a:p>
-              </p:txBody>
-            </p:sp>
-          </p:grpSp>
-          <p:cxnSp>
-            <p:nvCxnSpPr>
-              <p:cNvPr id="70" name="직선 화살표 연결선 69"/>
-              <p:cNvCxnSpPr>
-                <a:stCxn id="88" idx="2"/>
-              </p:cNvCxnSpPr>
-              <p:nvPr/>
-            </p:nvCxnSpPr>
-            <p:spPr>
-              <a:xfrm flipH="1">
-                <a:off x="1757239" y="1168842"/>
-                <a:ext cx="405516" cy="2178657"/>
-              </a:xfrm>
-              <a:prstGeom prst="straightConnector1">
-                <a:avLst/>
-              </a:prstGeom>
-              <a:ln>
-                <a:solidFill>
-                  <a:schemeClr val="tx1"/>
-                </a:solidFill>
-                <a:tailEnd type="triangle"/>
-              </a:ln>
-            </p:spPr>
-            <p:style>
-              <a:lnRef idx="1">
-                <a:schemeClr val="accent1"/>
-              </a:lnRef>
-              <a:fillRef idx="0">
-                <a:schemeClr val="accent1"/>
-              </a:fillRef>
-              <a:effectRef idx="0">
-                <a:schemeClr val="accent1"/>
-              </a:effectRef>
-              <a:fontRef idx="minor">
+              </a:solidFill>
+            </a:ln>
+          </p:spPr>
+          <p:style>
+            <a:lnRef idx="2">
+              <a:schemeClr val="accent1">
+                <a:shade val="50000"/>
+              </a:schemeClr>
+            </a:lnRef>
+            <a:fillRef idx="1">
+              <a:schemeClr val="accent1"/>
+            </a:fillRef>
+            <a:effectRef idx="0">
+              <a:schemeClr val="accent1"/>
+            </a:effectRef>
+            <a:fontRef idx="minor">
+              <a:schemeClr val="lt1"/>
+            </a:fontRef>
+          </p:style>
+          <p:txBody>
+            <a:bodyPr rtlCol="0" anchor="ctr"/>
+            <a:lstStyle/>
+            <a:p>
+              <a:pPr algn="ctr"/>
+              <a:endParaRPr lang="ko-KR" altLang="en-US"/>
+            </a:p>
+          </p:txBody>
+        </p:sp>
+        <p:sp>
+          <p:nvSpPr>
+            <p:cNvPr id="50" name="직사각형 49"/>
+            <p:cNvSpPr/>
+            <p:nvPr/>
+          </p:nvSpPr>
+          <p:spPr>
+            <a:xfrm>
+              <a:off x="7357920" y="3545805"/>
+              <a:ext cx="407184" cy="399501"/>
+            </a:xfrm>
+            <a:prstGeom prst="rect">
+              <a:avLst/>
+            </a:prstGeom>
+            <a:solidFill>
+              <a:srgbClr val="FFFF00"/>
+            </a:solidFill>
+            <a:ln>
+              <a:solidFill>
                 <a:schemeClr val="tx1"/>
-              </a:fontRef>
-            </p:style>
-          </p:cxnSp>
-          <p:cxnSp>
-            <p:nvCxnSpPr>
-              <p:cNvPr id="71" name="직선 화살표 연결선 70"/>
-              <p:cNvCxnSpPr>
-                <a:stCxn id="85" idx="2"/>
-              </p:cNvCxnSpPr>
-              <p:nvPr/>
-            </p:nvCxnSpPr>
-            <p:spPr>
-              <a:xfrm flipH="1">
-                <a:off x="2177664" y="1168842"/>
-                <a:ext cx="1623059" cy="2164743"/>
-              </a:xfrm>
-              <a:prstGeom prst="straightConnector1">
-                <a:avLst/>
-              </a:prstGeom>
-              <a:ln>
-                <a:solidFill>
-                  <a:schemeClr val="tx1"/>
-                </a:solidFill>
-                <a:tailEnd type="triangle"/>
-              </a:ln>
-            </p:spPr>
-            <p:style>
-              <a:lnRef idx="1">
-                <a:schemeClr val="accent1"/>
-              </a:lnRef>
-              <a:fillRef idx="0">
-                <a:schemeClr val="accent1"/>
-              </a:fillRef>
-              <a:effectRef idx="0">
-                <a:schemeClr val="accent1"/>
-              </a:effectRef>
-              <a:fontRef idx="minor">
+              </a:solidFill>
+            </a:ln>
+          </p:spPr>
+          <p:style>
+            <a:lnRef idx="2">
+              <a:schemeClr val="accent1">
+                <a:shade val="50000"/>
+              </a:schemeClr>
+            </a:lnRef>
+            <a:fillRef idx="1">
+              <a:schemeClr val="accent1"/>
+            </a:fillRef>
+            <a:effectRef idx="0">
+              <a:schemeClr val="accent1"/>
+            </a:effectRef>
+            <a:fontRef idx="minor">
+              <a:schemeClr val="lt1"/>
+            </a:fontRef>
+          </p:style>
+          <p:txBody>
+            <a:bodyPr rtlCol="0" anchor="ctr"/>
+            <a:lstStyle/>
+            <a:p>
+              <a:pPr algn="ctr"/>
+              <a:endParaRPr lang="ko-KR" altLang="en-US"/>
+            </a:p>
+          </p:txBody>
+        </p:sp>
+        <p:sp>
+          <p:nvSpPr>
+            <p:cNvPr id="51" name="직사각형 50"/>
+            <p:cNvSpPr/>
+            <p:nvPr/>
+          </p:nvSpPr>
+          <p:spPr>
+            <a:xfrm>
+              <a:off x="7765104" y="3545805"/>
+              <a:ext cx="407184" cy="399501"/>
+            </a:xfrm>
+            <a:prstGeom prst="rect">
+              <a:avLst/>
+            </a:prstGeom>
+            <a:solidFill>
+              <a:srgbClr val="7030A0"/>
+            </a:solidFill>
+            <a:ln>
+              <a:solidFill>
                 <a:schemeClr val="tx1"/>
-              </a:fontRef>
-            </p:style>
-          </p:cxnSp>
-          <p:sp>
-            <p:nvSpPr>
-              <p:cNvPr id="72" name="TextBox 71"/>
-              <p:cNvSpPr txBox="1"/>
-              <p:nvPr/>
-            </p:nvSpPr>
-            <p:spPr>
-              <a:xfrm>
-                <a:off x="3396201" y="4208785"/>
-                <a:ext cx="1472980" cy="307777"/>
-              </a:xfrm>
-              <a:prstGeom prst="rect">
-                <a:avLst/>
-              </a:prstGeom>
-              <a:noFill/>
-            </p:spPr>
-            <p:txBody>
-              <a:bodyPr wrap="square" rtlCol="0">
-                <a:spAutoFit/>
-              </a:bodyPr>
-              <a:lstStyle/>
-              <a:p>
-                <a:pPr algn="ctr"/>
-                <a:r>
-                  <a:rPr lang="en-US" altLang="ko-KR" sz="1400" dirty="0" err="1" smtClean="0"/>
-                  <a:t>gridDim.x</a:t>
-                </a:r>
-                <a:r>
-                  <a:rPr lang="en-US" altLang="ko-KR" sz="1400" dirty="0" smtClean="0"/>
-                  <a:t> = 2</a:t>
-                </a:r>
-                <a:endParaRPr lang="ko-KR" altLang="en-US" sz="1400" dirty="0"/>
-              </a:p>
-            </p:txBody>
-          </p:sp>
-          <p:cxnSp>
-            <p:nvCxnSpPr>
-              <p:cNvPr id="73" name="직선 연결선 72"/>
-              <p:cNvCxnSpPr/>
-              <p:nvPr/>
-            </p:nvCxnSpPr>
-            <p:spPr>
-              <a:xfrm>
-                <a:off x="1598212" y="3171543"/>
-                <a:ext cx="0" cy="1025718"/>
-              </a:xfrm>
-              <a:prstGeom prst="line">
-                <a:avLst/>
-              </a:prstGeom>
-              <a:ln>
-                <a:solidFill>
-                  <a:schemeClr val="tx1"/>
-                </a:solidFill>
-              </a:ln>
-            </p:spPr>
-            <p:style>
-              <a:lnRef idx="1">
-                <a:schemeClr val="accent1"/>
-              </a:lnRef>
-              <a:fillRef idx="0">
-                <a:schemeClr val="accent1"/>
-              </a:fillRef>
-              <a:effectRef idx="0">
-                <a:schemeClr val="accent1"/>
-              </a:effectRef>
-              <a:fontRef idx="minor">
+              </a:solidFill>
+            </a:ln>
+          </p:spPr>
+          <p:style>
+            <a:lnRef idx="2">
+              <a:schemeClr val="accent1">
+                <a:shade val="50000"/>
+              </a:schemeClr>
+            </a:lnRef>
+            <a:fillRef idx="1">
+              <a:schemeClr val="accent1"/>
+            </a:fillRef>
+            <a:effectRef idx="0">
+              <a:schemeClr val="accent1"/>
+            </a:effectRef>
+            <a:fontRef idx="minor">
+              <a:schemeClr val="lt1"/>
+            </a:fontRef>
+          </p:style>
+          <p:txBody>
+            <a:bodyPr rtlCol="0" anchor="ctr"/>
+            <a:lstStyle/>
+            <a:p>
+              <a:pPr algn="ctr"/>
+              <a:endParaRPr lang="ko-KR" altLang="en-US"/>
+            </a:p>
+          </p:txBody>
+        </p:sp>
+        <p:sp>
+          <p:nvSpPr>
+            <p:cNvPr id="52" name="직사각형 51"/>
+            <p:cNvSpPr/>
+            <p:nvPr/>
+          </p:nvSpPr>
+          <p:spPr>
+            <a:xfrm>
+              <a:off x="8172288" y="3545805"/>
+              <a:ext cx="407184" cy="399501"/>
+            </a:xfrm>
+            <a:prstGeom prst="rect">
+              <a:avLst/>
+            </a:prstGeom>
+            <a:solidFill>
+              <a:srgbClr val="FFC000"/>
+            </a:solidFill>
+            <a:ln>
+              <a:solidFill>
                 <a:schemeClr val="tx1"/>
-              </a:fontRef>
-            </p:style>
-          </p:cxnSp>
-          <p:sp>
-            <p:nvSpPr>
-              <p:cNvPr id="74" name="TextBox 73"/>
-              <p:cNvSpPr txBox="1"/>
-              <p:nvPr/>
-            </p:nvSpPr>
-            <p:spPr>
-              <a:xfrm>
-                <a:off x="861722" y="4190337"/>
-                <a:ext cx="1472980" cy="307777"/>
-              </a:xfrm>
-              <a:prstGeom prst="rect">
-                <a:avLst/>
-              </a:prstGeom>
-              <a:noFill/>
-            </p:spPr>
-            <p:txBody>
-              <a:bodyPr wrap="square" rtlCol="0">
-                <a:spAutoFit/>
-              </a:bodyPr>
-              <a:lstStyle/>
-              <a:p>
-                <a:pPr algn="ctr"/>
-                <a:r>
-                  <a:rPr lang="en-US" altLang="ko-KR" sz="1400" dirty="0" err="1" smtClean="0"/>
-                  <a:t>gridDim.x</a:t>
-                </a:r>
-                <a:r>
-                  <a:rPr lang="en-US" altLang="ko-KR" sz="1400" dirty="0" smtClean="0"/>
-                  <a:t> = 0</a:t>
-                </a:r>
-                <a:endParaRPr lang="ko-KR" altLang="en-US" sz="1400" dirty="0"/>
-              </a:p>
-            </p:txBody>
-          </p:sp>
-        </p:grpSp>
+              </a:solidFill>
+            </a:ln>
+          </p:spPr>
+          <p:style>
+            <a:lnRef idx="2">
+              <a:schemeClr val="accent1">
+                <a:shade val="50000"/>
+              </a:schemeClr>
+            </a:lnRef>
+            <a:fillRef idx="1">
+              <a:schemeClr val="accent1"/>
+            </a:fillRef>
+            <a:effectRef idx="0">
+              <a:schemeClr val="accent1"/>
+            </a:effectRef>
+            <a:fontRef idx="minor">
+              <a:schemeClr val="lt1"/>
+            </a:fontRef>
+          </p:style>
+          <p:txBody>
+            <a:bodyPr rtlCol="0" anchor="ctr"/>
+            <a:lstStyle/>
+            <a:p>
+              <a:pPr algn="ctr"/>
+              <a:endParaRPr lang="ko-KR" altLang="en-US"/>
+            </a:p>
+          </p:txBody>
+        </p:sp>
       </p:grpSp>
     </p:spTree>
     <p:extLst>
@@ -18927,7 +19284,7 @@
                                           </p:stCondLst>
                                         </p:cTn>
                                         <p:tgtEl>
-                                          <p:spTgt spid="56"/>
+                                          <p:spTgt spid="8"/>
                                         </p:tgtEl>
                                         <p:attrNameLst>
                                           <p:attrName>style.visibility</p:attrName>
@@ -18941,7 +19298,7 @@
                                       <p:cBhvr>
                                         <p:cTn id="7" dur="500"/>
                                         <p:tgtEl>
-                                          <p:spTgt spid="56"/>
+                                          <p:spTgt spid="8"/>
                                         </p:tgtEl>
                                       </p:cBhvr>
                                     </p:animEffect>

</xml_diff>